<commit_message>
Adding TODO comment in the slide notes
</commit_message>
<xml_diff>
--- a/Fundamentals/pollacks_rule/lecture_slides.pptx
+++ b/Fundamentals/pollacks_rule/lecture_slides.pptx
@@ -223,7 +223,7 @@
           <a:p>
             <a:fld id="{9469DB13-C22C-F442-B7F3-F9EB0490D9DD}" type="datetimeFigureOut">
               <a:rPr lang="en-US" smtClean="0"/>
-              <a:t>7/18/22</a:t>
+              <a:t>7/19/22</a:t>
             </a:fld>
             <a:endParaRPr lang="en-US"/>
           </a:p>
@@ -533,22 +533,22 @@
           <a:p>
             <a:r>
               <a:rPr lang="en-US" dirty="0"/>
-              <a:t>Add slide relating performance and time</a:t>
-            </a:r>
-          </a:p>
-          <a:p>
+              <a:t>Add slide relating performance and time; talk </a:t>
+            </a:r>
+            <a:r>
+              <a:rPr lang="en-US"/>
+              <a:t>about normalizing</a:t>
+            </a:r>
             <a:endParaRPr lang="en-US" dirty="0"/>
           </a:p>
           <a:p>
+            <a:endParaRPr lang="en-US" dirty="0"/>
+          </a:p>
+          <a:p>
             <a:r>
               <a:rPr lang="en-US" dirty="0"/>
-              <a:t>Add notes giving narration </a:t>
-            </a:r>
-            <a:r>
-              <a:rPr lang="en-US"/>
-              <a:t>for each slide</a:t>
-            </a:r>
-            <a:endParaRPr lang="en-US" dirty="0"/>
+              <a:t>Add notes giving narration for each slide</a:t>
+            </a:r>
           </a:p>
         </p:txBody>
       </p:sp>
@@ -1213,7 +1213,7 @@
           <a:p>
             <a:fld id="{E0BDE9C3-A99F-B542-B075-08FB2E26F2F2}" type="datetimeFigureOut">
               <a:rPr lang="en-US" smtClean="0"/>
-              <a:t>7/18/22</a:t>
+              <a:t>7/19/22</a:t>
             </a:fld>
             <a:endParaRPr lang="en-US"/>
           </a:p>
@@ -1376,7 +1376,7 @@
           <a:p>
             <a:fld id="{E0BDE9C3-A99F-B542-B075-08FB2E26F2F2}" type="datetimeFigureOut">
               <a:rPr lang="en-US" smtClean="0"/>
-              <a:t>7/18/22</a:t>
+              <a:t>7/19/22</a:t>
             </a:fld>
             <a:endParaRPr lang="en-US"/>
           </a:p>
@@ -1549,7 +1549,7 @@
           <a:p>
             <a:fld id="{E0BDE9C3-A99F-B542-B075-08FB2E26F2F2}" type="datetimeFigureOut">
               <a:rPr lang="en-US" smtClean="0"/>
-              <a:t>7/18/22</a:t>
+              <a:t>7/19/22</a:t>
             </a:fld>
             <a:endParaRPr lang="en-US"/>
           </a:p>
@@ -1712,7 +1712,7 @@
           <a:p>
             <a:fld id="{E0BDE9C3-A99F-B542-B075-08FB2E26F2F2}" type="datetimeFigureOut">
               <a:rPr lang="en-US" smtClean="0"/>
-              <a:t>7/18/22</a:t>
+              <a:t>7/19/22</a:t>
             </a:fld>
             <a:endParaRPr lang="en-US"/>
           </a:p>
@@ -1952,7 +1952,7 @@
           <a:p>
             <a:fld id="{E0BDE9C3-A99F-B542-B075-08FB2E26F2F2}" type="datetimeFigureOut">
               <a:rPr lang="en-US" smtClean="0"/>
-              <a:t>7/18/22</a:t>
+              <a:t>7/19/22</a:t>
             </a:fld>
             <a:endParaRPr lang="en-US"/>
           </a:p>
@@ -2232,7 +2232,7 @@
           <a:p>
             <a:fld id="{E0BDE9C3-A99F-B542-B075-08FB2E26F2F2}" type="datetimeFigureOut">
               <a:rPr lang="en-US" smtClean="0"/>
-              <a:t>7/18/22</a:t>
+              <a:t>7/19/22</a:t>
             </a:fld>
             <a:endParaRPr lang="en-US"/>
           </a:p>
@@ -2646,7 +2646,7 @@
           <a:p>
             <a:fld id="{E0BDE9C3-A99F-B542-B075-08FB2E26F2F2}" type="datetimeFigureOut">
               <a:rPr lang="en-US" smtClean="0"/>
-              <a:t>7/18/22</a:t>
+              <a:t>7/19/22</a:t>
             </a:fld>
             <a:endParaRPr lang="en-US"/>
           </a:p>
@@ -2758,7 +2758,7 @@
           <a:p>
             <a:fld id="{E0BDE9C3-A99F-B542-B075-08FB2E26F2F2}" type="datetimeFigureOut">
               <a:rPr lang="en-US" smtClean="0"/>
-              <a:t>7/18/22</a:t>
+              <a:t>7/19/22</a:t>
             </a:fld>
             <a:endParaRPr lang="en-US"/>
           </a:p>
@@ -2848,7 +2848,7 @@
           <a:p>
             <a:fld id="{E0BDE9C3-A99F-B542-B075-08FB2E26F2F2}" type="datetimeFigureOut">
               <a:rPr lang="en-US" smtClean="0"/>
-              <a:t>7/18/22</a:t>
+              <a:t>7/19/22</a:t>
             </a:fld>
             <a:endParaRPr lang="en-US"/>
           </a:p>
@@ -3118,7 +3118,7 @@
           <a:p>
             <a:fld id="{E0BDE9C3-A99F-B542-B075-08FB2E26F2F2}" type="datetimeFigureOut">
               <a:rPr lang="en-US" smtClean="0"/>
-              <a:t>7/18/22</a:t>
+              <a:t>7/19/22</a:t>
             </a:fld>
             <a:endParaRPr lang="en-US"/>
           </a:p>
@@ -3365,7 +3365,7 @@
           <a:p>
             <a:fld id="{E0BDE9C3-A99F-B542-B075-08FB2E26F2F2}" type="datetimeFigureOut">
               <a:rPr lang="en-US" smtClean="0"/>
-              <a:t>7/18/22</a:t>
+              <a:t>7/19/22</a:t>
             </a:fld>
             <a:endParaRPr lang="en-US"/>
           </a:p>
@@ -3571,7 +3571,7 @@
           <a:p>
             <a:fld id="{E0BDE9C3-A99F-B542-B075-08FB2E26F2F2}" type="datetimeFigureOut">
               <a:rPr lang="en-US" smtClean="0"/>
-              <a:t>7/18/22</a:t>
+              <a:t>7/19/22</a:t>
             </a:fld>
             <a:endParaRPr lang="en-US"/>
           </a:p>
@@ -8044,13 +8044,8 @@
           <a:p>
             <a:r>
               <a:rPr lang="en-US" sz="2800" dirty="0"/>
-              <a:t> B = fraction of program that can run in </a:t>
-            </a:r>
-            <a:r>
-              <a:rPr lang="en-US" sz="2800" dirty="0" err="1"/>
-              <a:t>paralllel</a:t>
-            </a:r>
-            <a:endParaRPr lang="en-US" sz="2800" dirty="0"/>
+              <a:t> B = fraction of program that can run in parallel</a:t>
+            </a:r>
           </a:p>
         </p:txBody>
       </p:sp>

</xml_diff>